<commit_message>
updated the sequence diagram
</commit_message>
<xml_diff>
--- a/docs/diagrams/MemberSortCommand_LogicComponentSequenceDiagram.pptx
+++ b/docs/diagrams/MemberSortCommand_LogicComponentSequenceDiagram.pptx
@@ -4308,8 +4308,8 @@
         </p:nvSpPr>
         <p:spPr>
           <a:xfrm>
-            <a:off x="2552219" y="3082866"/>
-            <a:ext cx="1424846" cy="646331"/>
+            <a:off x="2325331" y="3082866"/>
+            <a:ext cx="1651734" cy="646331"/>
           </a:xfrm>
           <a:prstGeom prst="rect">
             <a:avLst/>
@@ -4814,7 +4814,7 @@
                   </a:schemeClr>
                 </a:solidFill>
               </a:rPr>
-              <a:t>Clubmanager</a:t>
+              <a:t>ClubManager</a:t>
             </a:r>
             <a:r>
               <a:rPr lang="en-US" sz="1400" dirty="0">

</xml_diff>

<commit_message>
Updated developer guide and PPP
</commit_message>
<xml_diff>
--- a/docs/diagrams/MemberSortCommand_LogicComponentSequenceDiagram.pptx
+++ b/docs/diagrams/MemberSortCommand_LogicComponentSequenceDiagram.pptx
@@ -208,7 +208,7 @@
           <a:p>
             <a:fld id="{F5CC4B3F-88C1-4FFA-B1B6-F41C21DC6924}" type="datetimeFigureOut">
               <a:rPr lang="en-US" smtClean="0"/>
-              <a:t>3/19/2019</a:t>
+              <a:t>4/15/2019</a:t>
             </a:fld>
             <a:endParaRPr lang="en-US"/>
           </a:p>
@@ -738,7 +738,7 @@
           <a:p>
             <a:fld id="{78C97017-6FC3-485B-9764-EAC9E56C1D49}" type="datetimeFigureOut">
               <a:rPr lang="en-US" smtClean="0"/>
-              <a:t>3/19/2019</a:t>
+              <a:t>4/15/2019</a:t>
             </a:fld>
             <a:endParaRPr lang="en-US"/>
           </a:p>
@@ -906,7 +906,7 @@
           <a:p>
             <a:fld id="{78C97017-6FC3-485B-9764-EAC9E56C1D49}" type="datetimeFigureOut">
               <a:rPr lang="en-US" smtClean="0"/>
-              <a:t>3/19/2019</a:t>
+              <a:t>4/15/2019</a:t>
             </a:fld>
             <a:endParaRPr lang="en-US"/>
           </a:p>
@@ -1084,7 +1084,7 @@
           <a:p>
             <a:fld id="{78C97017-6FC3-485B-9764-EAC9E56C1D49}" type="datetimeFigureOut">
               <a:rPr lang="en-US" smtClean="0"/>
-              <a:t>3/19/2019</a:t>
+              <a:t>4/15/2019</a:t>
             </a:fld>
             <a:endParaRPr lang="en-US"/>
           </a:p>
@@ -1252,7 +1252,7 @@
           <a:p>
             <a:fld id="{78C97017-6FC3-485B-9764-EAC9E56C1D49}" type="datetimeFigureOut">
               <a:rPr lang="en-US" smtClean="0"/>
-              <a:t>3/19/2019</a:t>
+              <a:t>4/15/2019</a:t>
             </a:fld>
             <a:endParaRPr lang="en-US"/>
           </a:p>
@@ -1497,7 +1497,7 @@
           <a:p>
             <a:fld id="{78C97017-6FC3-485B-9764-EAC9E56C1D49}" type="datetimeFigureOut">
               <a:rPr lang="en-US" smtClean="0"/>
-              <a:t>3/19/2019</a:t>
+              <a:t>4/15/2019</a:t>
             </a:fld>
             <a:endParaRPr lang="en-US"/>
           </a:p>
@@ -1782,7 +1782,7 @@
           <a:p>
             <a:fld id="{78C97017-6FC3-485B-9764-EAC9E56C1D49}" type="datetimeFigureOut">
               <a:rPr lang="en-US" smtClean="0"/>
-              <a:t>3/19/2019</a:t>
+              <a:t>4/15/2019</a:t>
             </a:fld>
             <a:endParaRPr lang="en-US"/>
           </a:p>
@@ -2201,7 +2201,7 @@
           <a:p>
             <a:fld id="{78C97017-6FC3-485B-9764-EAC9E56C1D49}" type="datetimeFigureOut">
               <a:rPr lang="en-US" smtClean="0"/>
-              <a:t>3/19/2019</a:t>
+              <a:t>4/15/2019</a:t>
             </a:fld>
             <a:endParaRPr lang="en-US"/>
           </a:p>
@@ -2318,7 +2318,7 @@
           <a:p>
             <a:fld id="{78C97017-6FC3-485B-9764-EAC9E56C1D49}" type="datetimeFigureOut">
               <a:rPr lang="en-US" smtClean="0"/>
-              <a:t>3/19/2019</a:t>
+              <a:t>4/15/2019</a:t>
             </a:fld>
             <a:endParaRPr lang="en-US"/>
           </a:p>
@@ -2413,7 +2413,7 @@
           <a:p>
             <a:fld id="{78C97017-6FC3-485B-9764-EAC9E56C1D49}" type="datetimeFigureOut">
               <a:rPr lang="en-US" smtClean="0"/>
-              <a:t>3/19/2019</a:t>
+              <a:t>4/15/2019</a:t>
             </a:fld>
             <a:endParaRPr lang="en-US"/>
           </a:p>
@@ -2688,7 +2688,7 @@
           <a:p>
             <a:fld id="{78C97017-6FC3-485B-9764-EAC9E56C1D49}" type="datetimeFigureOut">
               <a:rPr lang="en-US" smtClean="0"/>
-              <a:t>3/19/2019</a:t>
+              <a:t>4/15/2019</a:t>
             </a:fld>
             <a:endParaRPr lang="en-US"/>
           </a:p>
@@ -2940,7 +2940,7 @@
           <a:p>
             <a:fld id="{78C97017-6FC3-485B-9764-EAC9E56C1D49}" type="datetimeFigureOut">
               <a:rPr lang="en-US" smtClean="0"/>
-              <a:t>3/19/2019</a:t>
+              <a:t>4/15/2019</a:t>
             </a:fld>
             <a:endParaRPr lang="en-US"/>
           </a:p>
@@ -3151,7 +3151,7 @@
           <a:p>
             <a:fld id="{78C97017-6FC3-485B-9764-EAC9E56C1D49}" type="datetimeFigureOut">
               <a:rPr lang="en-US" smtClean="0"/>
-              <a:t>3/19/2019</a:t>
+              <a:t>4/15/2019</a:t>
             </a:fld>
             <a:endParaRPr lang="en-US"/>
           </a:p>
@@ -4428,7 +4428,7 @@
                   <a:srgbClr val="7030A0"/>
                 </a:solidFill>
               </a:rPr>
-              <a:t>sortClubManager</a:t>
+              <a:t>sortAddressBook</a:t>
             </a:r>
             <a:r>
               <a:rPr lang="en-US" sz="1400" dirty="0">

</xml_diff>